<commit_message>
Updated MAUI lecture presentation
</commit_message>
<xml_diff>
--- a/Lecture/PV239-NET-MAUI.pptx
+++ b/Lecture/PV239-NET-MAUI.pptx
@@ -5,7 +5,7 @@
     <p:sldMasterId id="2147483648" r:id="rId1"/>
   </p:sldMasterIdLst>
   <p:notesMasterIdLst>
-    <p:notesMasterId r:id="rId34"/>
+    <p:notesMasterId r:id="rId33"/>
   </p:notesMasterIdLst>
   <p:sldIdLst>
     <p:sldId id="364" r:id="rId2"/>
@@ -37,9 +37,8 @@
     <p:sldId id="301" r:id="rId28"/>
     <p:sldId id="304" r:id="rId29"/>
     <p:sldId id="382" r:id="rId30"/>
-    <p:sldId id="385" r:id="rId31"/>
-    <p:sldId id="281" r:id="rId32"/>
-    <p:sldId id="399" r:id="rId33"/>
+    <p:sldId id="281" r:id="rId31"/>
+    <p:sldId id="399" r:id="rId32"/>
   </p:sldIdLst>
   <p:sldSz cx="12192000" cy="6858000"/>
   <p:notesSz cx="6858000" cy="9144000"/>
@@ -2413,7 +2412,7 @@
           <a:p>
             <a:fld id="{E9C8C57A-904A-401B-9BB0-7B4B963B8AAD}" type="datetimeFigureOut">
               <a:rPr lang="en-US" smtClean="0"/>
-              <a:t>2023-02-11</a:t>
+              <a:t>03/17/2024</a:t>
             </a:fld>
             <a:endParaRPr lang="en-US"/>
           </a:p>
@@ -3077,7 +3076,7 @@
           <a:p>
             <a:fld id="{035CF161-778B-4FCF-8A35-83472121A034}" type="datetimeFigureOut">
               <a:rPr lang="en-US" smtClean="0"/>
-              <a:t>2023-02-11</a:t>
+              <a:t>03/17/2024</a:t>
             </a:fld>
             <a:endParaRPr lang="en-US"/>
           </a:p>
@@ -3275,7 +3274,7 @@
           <a:p>
             <a:fld id="{035CF161-778B-4FCF-8A35-83472121A034}" type="datetimeFigureOut">
               <a:rPr lang="en-US" smtClean="0"/>
-              <a:t>2023-02-11</a:t>
+              <a:t>03/17/2024</a:t>
             </a:fld>
             <a:endParaRPr lang="en-US"/>
           </a:p>
@@ -3483,7 +3482,7 @@
           <a:p>
             <a:fld id="{035CF161-778B-4FCF-8A35-83472121A034}" type="datetimeFigureOut">
               <a:rPr lang="en-US" smtClean="0"/>
-              <a:t>2023-02-11</a:t>
+              <a:t>03/17/2024</a:t>
             </a:fld>
             <a:endParaRPr lang="en-US"/>
           </a:p>
@@ -3825,7 +3824,7 @@
           <a:p>
             <a:fld id="{035CF161-778B-4FCF-8A35-83472121A034}" type="datetimeFigureOut">
               <a:rPr lang="en-US" smtClean="0"/>
-              <a:t>2023-02-11</a:t>
+              <a:t>03/17/2024</a:t>
             </a:fld>
             <a:endParaRPr lang="en-US"/>
           </a:p>
@@ -4100,7 +4099,7 @@
           <a:p>
             <a:fld id="{035CF161-778B-4FCF-8A35-83472121A034}" type="datetimeFigureOut">
               <a:rPr lang="en-US" smtClean="0"/>
-              <a:t>2023-02-11</a:t>
+              <a:t>03/17/2024</a:t>
             </a:fld>
             <a:endParaRPr lang="en-US"/>
           </a:p>
@@ -4365,7 +4364,7 @@
           <a:p>
             <a:fld id="{035CF161-778B-4FCF-8A35-83472121A034}" type="datetimeFigureOut">
               <a:rPr lang="en-US" smtClean="0"/>
-              <a:t>2023-02-11</a:t>
+              <a:t>03/17/2024</a:t>
             </a:fld>
             <a:endParaRPr lang="en-US"/>
           </a:p>
@@ -4777,7 +4776,7 @@
           <a:p>
             <a:fld id="{035CF161-778B-4FCF-8A35-83472121A034}" type="datetimeFigureOut">
               <a:rPr lang="en-US" smtClean="0"/>
-              <a:t>2023-02-11</a:t>
+              <a:t>03/17/2024</a:t>
             </a:fld>
             <a:endParaRPr lang="en-US"/>
           </a:p>
@@ -4918,7 +4917,7 @@
           <a:p>
             <a:fld id="{035CF161-778B-4FCF-8A35-83472121A034}" type="datetimeFigureOut">
               <a:rPr lang="en-US" smtClean="0"/>
-              <a:t>2023-02-11</a:t>
+              <a:t>03/17/2024</a:t>
             </a:fld>
             <a:endParaRPr lang="en-US"/>
           </a:p>
@@ -5031,7 +5030,7 @@
           <a:p>
             <a:fld id="{035CF161-778B-4FCF-8A35-83472121A034}" type="datetimeFigureOut">
               <a:rPr lang="en-US" smtClean="0"/>
-              <a:t>2023-02-11</a:t>
+              <a:t>03/17/2024</a:t>
             </a:fld>
             <a:endParaRPr lang="en-US"/>
           </a:p>
@@ -5342,7 +5341,7 @@
           <a:p>
             <a:fld id="{035CF161-778B-4FCF-8A35-83472121A034}" type="datetimeFigureOut">
               <a:rPr lang="en-US" smtClean="0"/>
-              <a:t>2023-02-11</a:t>
+              <a:t>03/17/2024</a:t>
             </a:fld>
             <a:endParaRPr lang="en-US"/>
           </a:p>
@@ -5630,7 +5629,7 @@
           <a:p>
             <a:fld id="{035CF161-778B-4FCF-8A35-83472121A034}" type="datetimeFigureOut">
               <a:rPr lang="en-US" smtClean="0"/>
-              <a:t>2023-02-11</a:t>
+              <a:t>03/17/2024</a:t>
             </a:fld>
             <a:endParaRPr lang="en-US"/>
           </a:p>
@@ -5871,7 +5870,7 @@
           <a:p>
             <a:fld id="{035CF161-778B-4FCF-8A35-83472121A034}" type="datetimeFigureOut">
               <a:rPr lang="en-US" smtClean="0"/>
-              <a:t>2023-02-11</a:t>
+              <a:t>03/17/2024</a:t>
             </a:fld>
             <a:endParaRPr lang="en-US"/>
           </a:p>
@@ -18584,6 +18583,12 @@
           </a:p>
           <a:p>
             <a:r>
+              <a:rPr lang="en-US" dirty="0"/>
+              <a:t>Prism</a:t>
+            </a:r>
+          </a:p>
+          <a:p>
+            <a:r>
               <a:rPr lang="en-US" dirty="0" err="1"/>
               <a:t>ReactiveUI</a:t>
             </a:r>
@@ -18834,6 +18839,55 @@
                                           <p:spTgt spid="3">
                                             <p:txEl>
                                               <p:pRg st="4" end="4"/>
+                                            </p:txEl>
+                                          </p:spTgt>
+                                        </p:tgtEl>
+                                        <p:attrNameLst>
+                                          <p:attrName>style.visibility</p:attrName>
+                                        </p:attrNameLst>
+                                      </p:cBhvr>
+                                      <p:to>
+                                        <p:strVal val="visible"/>
+                                      </p:to>
+                                    </p:set>
+                                  </p:childTnLst>
+                                </p:cTn>
+                              </p:par>
+                            </p:childTnLst>
+                          </p:cTn>
+                        </p:par>
+                      </p:childTnLst>
+                    </p:cTn>
+                  </p:par>
+                  <p:par>
+                    <p:cTn id="23" fill="hold">
+                      <p:stCondLst>
+                        <p:cond delay="indefinite"/>
+                      </p:stCondLst>
+                      <p:childTnLst>
+                        <p:par>
+                          <p:cTn id="24" fill="hold">
+                            <p:stCondLst>
+                              <p:cond delay="0"/>
+                            </p:stCondLst>
+                            <p:childTnLst>
+                              <p:par>
+                                <p:cTn id="25" presetID="1" presetClass="entr" presetSubtype="0" fill="hold" grpId="0" nodeType="clickEffect">
+                                  <p:stCondLst>
+                                    <p:cond delay="0"/>
+                                  </p:stCondLst>
+                                  <p:childTnLst>
+                                    <p:set>
+                                      <p:cBhvr>
+                                        <p:cTn id="26" dur="1" fill="hold">
+                                          <p:stCondLst>
+                                            <p:cond delay="0"/>
+                                          </p:stCondLst>
+                                        </p:cTn>
+                                        <p:tgtEl>
+                                          <p:spTgt spid="3">
+                                            <p:txEl>
+                                              <p:pRg st="5" end="5"/>
                                             </p:txEl>
                                           </p:spTgt>
                                         </p:tgtEl>
@@ -20261,574 +20315,6 @@
       </p:grpSpPr>
       <p:sp>
         <p:nvSpPr>
-          <p:cNvPr id="2" name="Title 1">
-            <a:extLst>
-              <a:ext uri="{FF2B5EF4-FFF2-40B4-BE49-F238E27FC236}">
-                <a16:creationId xmlns:a16="http://schemas.microsoft.com/office/drawing/2014/main" id="{6317E66A-2A36-4B56-A22C-C06849A745B8}"/>
-              </a:ext>
-            </a:extLst>
-          </p:cNvPr>
-          <p:cNvSpPr>
-            <a:spLocks noGrp="1"/>
-          </p:cNvSpPr>
-          <p:nvPr>
-            <p:ph type="title"/>
-          </p:nvPr>
-        </p:nvSpPr>
-        <p:spPr/>
-        <p:txBody>
-          <a:bodyPr/>
-          <a:lstStyle/>
-          <a:p>
-            <a:r>
-              <a:rPr lang="en-US" dirty="0"/>
-              <a:t>MAUI vs. Xamarin</a:t>
-            </a:r>
-          </a:p>
-        </p:txBody>
-      </p:sp>
-      <p:sp>
-        <p:nvSpPr>
-          <p:cNvPr id="3" name="Content Placeholder 2">
-            <a:extLst>
-              <a:ext uri="{FF2B5EF4-FFF2-40B4-BE49-F238E27FC236}">
-                <a16:creationId xmlns:a16="http://schemas.microsoft.com/office/drawing/2014/main" id="{A06FC6CB-4900-4C56-A237-056B56CCDD0B}"/>
-              </a:ext>
-            </a:extLst>
-          </p:cNvPr>
-          <p:cNvSpPr>
-            <a:spLocks noGrp="1"/>
-          </p:cNvSpPr>
-          <p:nvPr>
-            <p:ph idx="1"/>
-          </p:nvPr>
-        </p:nvSpPr>
-        <p:spPr/>
-        <p:txBody>
-          <a:bodyPr/>
-          <a:lstStyle/>
-          <a:p>
-            <a:r>
-              <a:rPr lang="en-US" dirty="0"/>
-              <a:t>.NET 7, C# 11</a:t>
-            </a:r>
-          </a:p>
-          <a:p>
-            <a:r>
-              <a:rPr lang="sk-SK" dirty="0"/>
-              <a:t>Single </a:t>
-            </a:r>
-            <a:r>
-              <a:rPr lang="sk-SK" dirty="0" err="1"/>
-              <a:t>project</a:t>
-            </a:r>
-            <a:endParaRPr lang="sk-SK" dirty="0"/>
-          </a:p>
-          <a:p>
-            <a:pPr lvl="1"/>
-            <a:r>
-              <a:rPr lang="sk-SK" dirty="0" err="1"/>
-              <a:t>Unified</a:t>
-            </a:r>
-            <a:r>
-              <a:rPr lang="sk-SK" dirty="0"/>
-              <a:t> </a:t>
-            </a:r>
-            <a:r>
-              <a:rPr lang="sk-SK" dirty="0" err="1"/>
-              <a:t>working</a:t>
-            </a:r>
-            <a:r>
-              <a:rPr lang="sk-SK" dirty="0"/>
-              <a:t> </a:t>
-            </a:r>
-            <a:r>
-              <a:rPr lang="sk-SK" dirty="0" err="1"/>
-              <a:t>with</a:t>
-            </a:r>
-            <a:r>
-              <a:rPr lang="sk-SK" dirty="0"/>
-              <a:t> </a:t>
-            </a:r>
-            <a:r>
-              <a:rPr lang="sk-SK" dirty="0" err="1"/>
-              <a:t>images</a:t>
-            </a:r>
-            <a:r>
-              <a:rPr lang="sk-SK" dirty="0"/>
-              <a:t>, </a:t>
-            </a:r>
-            <a:r>
-              <a:rPr lang="sk-SK" dirty="0" err="1"/>
-              <a:t>fonts</a:t>
-            </a:r>
-            <a:r>
-              <a:rPr lang="en-US" dirty="0"/>
-              <a:t>, splash screen</a:t>
-            </a:r>
-            <a:r>
-              <a:rPr lang="sk-SK" dirty="0"/>
-              <a:t> and </a:t>
-            </a:r>
-            <a:r>
-              <a:rPr lang="sk-SK" dirty="0" err="1"/>
-              <a:t>other</a:t>
-            </a:r>
-            <a:r>
-              <a:rPr lang="sk-SK" dirty="0"/>
-              <a:t> </a:t>
-            </a:r>
-            <a:r>
-              <a:rPr lang="sk-SK" dirty="0" err="1"/>
-              <a:t>resources</a:t>
-            </a:r>
-            <a:endParaRPr lang="en-US" dirty="0"/>
-          </a:p>
-          <a:p>
-            <a:pPr lvl="1"/>
-            <a:r>
-              <a:rPr lang="en-US" dirty="0"/>
-              <a:t>Custom </a:t>
-            </a:r>
-            <a:r>
-              <a:rPr lang="sk-SK" dirty="0" err="1"/>
-              <a:t>Renderers</a:t>
-            </a:r>
-            <a:r>
-              <a:rPr lang="sk-SK" dirty="0"/>
-              <a:t> </a:t>
-            </a:r>
-            <a:r>
-              <a:rPr lang="en-US" dirty="0"/>
-              <a:t>-&gt; Handlers</a:t>
-            </a:r>
-          </a:p>
-          <a:p>
-            <a:r>
-              <a:rPr lang="sk-SK" dirty="0" err="1"/>
-              <a:t>IoC</a:t>
-            </a:r>
-            <a:r>
-              <a:rPr lang="sk-SK" dirty="0"/>
-              <a:t>/DI</a:t>
-            </a:r>
-            <a:endParaRPr lang="en-US" dirty="0"/>
-          </a:p>
-          <a:p>
-            <a:r>
-              <a:rPr lang="en-US" dirty="0"/>
-              <a:t>Unified working with WinRT</a:t>
-            </a:r>
-            <a:endParaRPr lang="sk-SK" dirty="0"/>
-          </a:p>
-          <a:p>
-            <a:r>
-              <a:rPr lang="en-US" dirty="0"/>
-              <a:t>Official support for Mac OS</a:t>
-            </a:r>
-          </a:p>
-          <a:p>
-            <a:endParaRPr lang="en-US" dirty="0"/>
-          </a:p>
-        </p:txBody>
-      </p:sp>
-      <p:sp>
-        <p:nvSpPr>
-          <p:cNvPr id="5" name="Slide Number Placeholder 4">
-            <a:extLst>
-              <a:ext uri="{FF2B5EF4-FFF2-40B4-BE49-F238E27FC236}">
-                <a16:creationId xmlns:a16="http://schemas.microsoft.com/office/drawing/2014/main" id="{87969D17-CB0F-46E2-A6E5-C127F7B8777A}"/>
-              </a:ext>
-            </a:extLst>
-          </p:cNvPr>
-          <p:cNvSpPr>
-            <a:spLocks noGrp="1"/>
-          </p:cNvSpPr>
-          <p:nvPr>
-            <p:ph type="sldNum" sz="quarter" idx="12"/>
-          </p:nvPr>
-        </p:nvSpPr>
-        <p:spPr/>
-        <p:txBody>
-          <a:bodyPr/>
-          <a:lstStyle/>
-          <a:p>
-            <a:endParaRPr lang="en-US" dirty="0"/>
-          </a:p>
-        </p:txBody>
-      </p:sp>
-    </p:spTree>
-    <p:extLst>
-      <p:ext uri="{BB962C8B-B14F-4D97-AF65-F5344CB8AC3E}">
-        <p14:creationId xmlns:p14="http://schemas.microsoft.com/office/powerpoint/2010/main" val="635587503"/>
-      </p:ext>
-    </p:extLst>
-  </p:cSld>
-  <p:clrMapOvr>
-    <a:masterClrMapping/>
-  </p:clrMapOvr>
-  <p:timing>
-    <p:tnLst>
-      <p:par>
-        <p:cTn id="1" dur="indefinite" restart="never" nodeType="tmRoot">
-          <p:childTnLst>
-            <p:seq concurrent="1" nextAc="seek">
-              <p:cTn id="2" dur="indefinite" nodeType="mainSeq">
-                <p:childTnLst>
-                  <p:par>
-                    <p:cTn id="3" fill="hold">
-                      <p:stCondLst>
-                        <p:cond delay="indefinite"/>
-                      </p:stCondLst>
-                      <p:childTnLst>
-                        <p:par>
-                          <p:cTn id="4" fill="hold">
-                            <p:stCondLst>
-                              <p:cond delay="0"/>
-                            </p:stCondLst>
-                            <p:childTnLst>
-                              <p:par>
-                                <p:cTn id="5" presetID="1" presetClass="entr" presetSubtype="0" fill="hold" grpId="0" nodeType="clickEffect">
-                                  <p:stCondLst>
-                                    <p:cond delay="0"/>
-                                  </p:stCondLst>
-                                  <p:childTnLst>
-                                    <p:set>
-                                      <p:cBhvr>
-                                        <p:cTn id="6" dur="1" fill="hold">
-                                          <p:stCondLst>
-                                            <p:cond delay="0"/>
-                                          </p:stCondLst>
-                                        </p:cTn>
-                                        <p:tgtEl>
-                                          <p:spTgt spid="3">
-                                            <p:txEl>
-                                              <p:pRg st="0" end="0"/>
-                                            </p:txEl>
-                                          </p:spTgt>
-                                        </p:tgtEl>
-                                        <p:attrNameLst>
-                                          <p:attrName>style.visibility</p:attrName>
-                                        </p:attrNameLst>
-                                      </p:cBhvr>
-                                      <p:to>
-                                        <p:strVal val="visible"/>
-                                      </p:to>
-                                    </p:set>
-                                  </p:childTnLst>
-                                </p:cTn>
-                              </p:par>
-                            </p:childTnLst>
-                          </p:cTn>
-                        </p:par>
-                      </p:childTnLst>
-                    </p:cTn>
-                  </p:par>
-                  <p:par>
-                    <p:cTn id="7" fill="hold">
-                      <p:stCondLst>
-                        <p:cond delay="indefinite"/>
-                      </p:stCondLst>
-                      <p:childTnLst>
-                        <p:par>
-                          <p:cTn id="8" fill="hold">
-                            <p:stCondLst>
-                              <p:cond delay="0"/>
-                            </p:stCondLst>
-                            <p:childTnLst>
-                              <p:par>
-                                <p:cTn id="9" presetID="1" presetClass="entr" presetSubtype="0" fill="hold" grpId="0" nodeType="clickEffect">
-                                  <p:stCondLst>
-                                    <p:cond delay="0"/>
-                                  </p:stCondLst>
-                                  <p:childTnLst>
-                                    <p:set>
-                                      <p:cBhvr>
-                                        <p:cTn id="10" dur="1" fill="hold">
-                                          <p:stCondLst>
-                                            <p:cond delay="0"/>
-                                          </p:stCondLst>
-                                        </p:cTn>
-                                        <p:tgtEl>
-                                          <p:spTgt spid="3">
-                                            <p:txEl>
-                                              <p:pRg st="1" end="1"/>
-                                            </p:txEl>
-                                          </p:spTgt>
-                                        </p:tgtEl>
-                                        <p:attrNameLst>
-                                          <p:attrName>style.visibility</p:attrName>
-                                        </p:attrNameLst>
-                                      </p:cBhvr>
-                                      <p:to>
-                                        <p:strVal val="visible"/>
-                                      </p:to>
-                                    </p:set>
-                                  </p:childTnLst>
-                                </p:cTn>
-                              </p:par>
-                              <p:par>
-                                <p:cTn id="11" presetID="1" presetClass="entr" presetSubtype="0" fill="hold" grpId="0" nodeType="withEffect">
-                                  <p:stCondLst>
-                                    <p:cond delay="0"/>
-                                  </p:stCondLst>
-                                  <p:childTnLst>
-                                    <p:set>
-                                      <p:cBhvr>
-                                        <p:cTn id="12" dur="1" fill="hold">
-                                          <p:stCondLst>
-                                            <p:cond delay="0"/>
-                                          </p:stCondLst>
-                                        </p:cTn>
-                                        <p:tgtEl>
-                                          <p:spTgt spid="3">
-                                            <p:txEl>
-                                              <p:pRg st="2" end="2"/>
-                                            </p:txEl>
-                                          </p:spTgt>
-                                        </p:tgtEl>
-                                        <p:attrNameLst>
-                                          <p:attrName>style.visibility</p:attrName>
-                                        </p:attrNameLst>
-                                      </p:cBhvr>
-                                      <p:to>
-                                        <p:strVal val="visible"/>
-                                      </p:to>
-                                    </p:set>
-                                  </p:childTnLst>
-                                </p:cTn>
-                              </p:par>
-                              <p:par>
-                                <p:cTn id="13" presetID="1" presetClass="entr" presetSubtype="0" fill="hold" grpId="0" nodeType="withEffect">
-                                  <p:stCondLst>
-                                    <p:cond delay="0"/>
-                                  </p:stCondLst>
-                                  <p:childTnLst>
-                                    <p:set>
-                                      <p:cBhvr>
-                                        <p:cTn id="14" dur="1" fill="hold">
-                                          <p:stCondLst>
-                                            <p:cond delay="0"/>
-                                          </p:stCondLst>
-                                        </p:cTn>
-                                        <p:tgtEl>
-                                          <p:spTgt spid="3">
-                                            <p:txEl>
-                                              <p:pRg st="3" end="3"/>
-                                            </p:txEl>
-                                          </p:spTgt>
-                                        </p:tgtEl>
-                                        <p:attrNameLst>
-                                          <p:attrName>style.visibility</p:attrName>
-                                        </p:attrNameLst>
-                                      </p:cBhvr>
-                                      <p:to>
-                                        <p:strVal val="visible"/>
-                                      </p:to>
-                                    </p:set>
-                                  </p:childTnLst>
-                                </p:cTn>
-                              </p:par>
-                            </p:childTnLst>
-                          </p:cTn>
-                        </p:par>
-                      </p:childTnLst>
-                    </p:cTn>
-                  </p:par>
-                  <p:par>
-                    <p:cTn id="15" fill="hold">
-                      <p:stCondLst>
-                        <p:cond delay="indefinite"/>
-                      </p:stCondLst>
-                      <p:childTnLst>
-                        <p:par>
-                          <p:cTn id="16" fill="hold">
-                            <p:stCondLst>
-                              <p:cond delay="0"/>
-                            </p:stCondLst>
-                            <p:childTnLst>
-                              <p:par>
-                                <p:cTn id="17" presetID="1" presetClass="entr" presetSubtype="0" fill="hold" grpId="0" nodeType="clickEffect">
-                                  <p:stCondLst>
-                                    <p:cond delay="0"/>
-                                  </p:stCondLst>
-                                  <p:childTnLst>
-                                    <p:set>
-                                      <p:cBhvr>
-                                        <p:cTn id="18" dur="1" fill="hold">
-                                          <p:stCondLst>
-                                            <p:cond delay="0"/>
-                                          </p:stCondLst>
-                                        </p:cTn>
-                                        <p:tgtEl>
-                                          <p:spTgt spid="3">
-                                            <p:txEl>
-                                              <p:pRg st="4" end="4"/>
-                                            </p:txEl>
-                                          </p:spTgt>
-                                        </p:tgtEl>
-                                        <p:attrNameLst>
-                                          <p:attrName>style.visibility</p:attrName>
-                                        </p:attrNameLst>
-                                      </p:cBhvr>
-                                      <p:to>
-                                        <p:strVal val="visible"/>
-                                      </p:to>
-                                    </p:set>
-                                  </p:childTnLst>
-                                </p:cTn>
-                              </p:par>
-                            </p:childTnLst>
-                          </p:cTn>
-                        </p:par>
-                      </p:childTnLst>
-                    </p:cTn>
-                  </p:par>
-                  <p:par>
-                    <p:cTn id="19" fill="hold">
-                      <p:stCondLst>
-                        <p:cond delay="indefinite"/>
-                      </p:stCondLst>
-                      <p:childTnLst>
-                        <p:par>
-                          <p:cTn id="20" fill="hold">
-                            <p:stCondLst>
-                              <p:cond delay="0"/>
-                            </p:stCondLst>
-                            <p:childTnLst>
-                              <p:par>
-                                <p:cTn id="21" presetID="1" presetClass="entr" presetSubtype="0" fill="hold" grpId="0" nodeType="clickEffect">
-                                  <p:stCondLst>
-                                    <p:cond delay="0"/>
-                                  </p:stCondLst>
-                                  <p:childTnLst>
-                                    <p:set>
-                                      <p:cBhvr>
-                                        <p:cTn id="22" dur="1" fill="hold">
-                                          <p:stCondLst>
-                                            <p:cond delay="0"/>
-                                          </p:stCondLst>
-                                        </p:cTn>
-                                        <p:tgtEl>
-                                          <p:spTgt spid="3">
-                                            <p:txEl>
-                                              <p:pRg st="5" end="5"/>
-                                            </p:txEl>
-                                          </p:spTgt>
-                                        </p:tgtEl>
-                                        <p:attrNameLst>
-                                          <p:attrName>style.visibility</p:attrName>
-                                        </p:attrNameLst>
-                                      </p:cBhvr>
-                                      <p:to>
-                                        <p:strVal val="visible"/>
-                                      </p:to>
-                                    </p:set>
-                                  </p:childTnLst>
-                                </p:cTn>
-                              </p:par>
-                            </p:childTnLst>
-                          </p:cTn>
-                        </p:par>
-                      </p:childTnLst>
-                    </p:cTn>
-                  </p:par>
-                  <p:par>
-                    <p:cTn id="23" fill="hold">
-                      <p:stCondLst>
-                        <p:cond delay="indefinite"/>
-                      </p:stCondLst>
-                      <p:childTnLst>
-                        <p:par>
-                          <p:cTn id="24" fill="hold">
-                            <p:stCondLst>
-                              <p:cond delay="0"/>
-                            </p:stCondLst>
-                            <p:childTnLst>
-                              <p:par>
-                                <p:cTn id="25" presetID="1" presetClass="entr" presetSubtype="0" fill="hold" grpId="0" nodeType="clickEffect">
-                                  <p:stCondLst>
-                                    <p:cond delay="0"/>
-                                  </p:stCondLst>
-                                  <p:childTnLst>
-                                    <p:set>
-                                      <p:cBhvr>
-                                        <p:cTn id="26" dur="1" fill="hold">
-                                          <p:stCondLst>
-                                            <p:cond delay="0"/>
-                                          </p:stCondLst>
-                                        </p:cTn>
-                                        <p:tgtEl>
-                                          <p:spTgt spid="3">
-                                            <p:txEl>
-                                              <p:pRg st="6" end="6"/>
-                                            </p:txEl>
-                                          </p:spTgt>
-                                        </p:tgtEl>
-                                        <p:attrNameLst>
-                                          <p:attrName>style.visibility</p:attrName>
-                                        </p:attrNameLst>
-                                      </p:cBhvr>
-                                      <p:to>
-                                        <p:strVal val="visible"/>
-                                      </p:to>
-                                    </p:set>
-                                  </p:childTnLst>
-                                </p:cTn>
-                              </p:par>
-                            </p:childTnLst>
-                          </p:cTn>
-                        </p:par>
-                      </p:childTnLst>
-                    </p:cTn>
-                  </p:par>
-                </p:childTnLst>
-              </p:cTn>
-              <p:prevCondLst>
-                <p:cond evt="onPrev" delay="0">
-                  <p:tgtEl>
-                    <p:sldTgt/>
-                  </p:tgtEl>
-                </p:cond>
-              </p:prevCondLst>
-              <p:nextCondLst>
-                <p:cond evt="onNext" delay="0">
-                  <p:tgtEl>
-                    <p:sldTgt/>
-                  </p:tgtEl>
-                </p:cond>
-              </p:nextCondLst>
-            </p:seq>
-          </p:childTnLst>
-        </p:cTn>
-      </p:par>
-    </p:tnLst>
-    <p:bldLst>
-      <p:bldP spid="3" grpId="0" build="p"/>
-    </p:bldLst>
-  </p:timing>
-</p:sld>
-</file>
-
-<file path=ppt/slides/slide31.xml><?xml version="1.0" encoding="utf-8"?>
-<p:sld xmlns:a="http://schemas.openxmlformats.org/drawingml/2006/main" xmlns:r="http://schemas.openxmlformats.org/officeDocument/2006/relationships" xmlns:p="http://schemas.openxmlformats.org/presentationml/2006/main">
-  <p:cSld>
-    <p:spTree>
-      <p:nvGrpSpPr>
-        <p:cNvPr id="1" name=""/>
-        <p:cNvGrpSpPr/>
-        <p:nvPr/>
-      </p:nvGrpSpPr>
-      <p:grpSpPr>
-        <a:xfrm>
-          <a:off x="0" y="0"/>
-          <a:ext cx="0" cy="0"/>
-          <a:chOff x="0" y="0"/>
-          <a:chExt cx="0" cy="0"/>
-        </a:xfrm>
-      </p:grpSpPr>
-      <p:sp>
-        <p:nvSpPr>
           <p:cNvPr id="2" name="Title 1"/>
           <p:cNvSpPr>
             <a:spLocks noGrp="1"/>
@@ -21161,7 +20647,7 @@
 </p:sld>
 </file>
 
-<file path=ppt/slides/slide32.xml><?xml version="1.0" encoding="utf-8"?>
+<file path=ppt/slides/slide31.xml><?xml version="1.0" encoding="utf-8"?>
 <p:sld xmlns:a="http://schemas.openxmlformats.org/drawingml/2006/main" xmlns:r="http://schemas.openxmlformats.org/officeDocument/2006/relationships" xmlns:p="http://schemas.openxmlformats.org/presentationml/2006/main">
   <p:cSld>
     <p:spTree>

</xml_diff>

<commit_message>
Updated Lecture MAUI presentation
</commit_message>
<xml_diff>
--- a/Lecture/PV239-NET-MAUI.pptx
+++ b/Lecture/PV239-NET-MAUI.pptx
@@ -5,7 +5,7 @@
     <p:sldMasterId id="2147483648" r:id="rId1"/>
   </p:sldMasterIdLst>
   <p:notesMasterIdLst>
-    <p:notesMasterId r:id="rId33"/>
+    <p:notesMasterId r:id="rId34"/>
   </p:notesMasterIdLst>
   <p:sldIdLst>
     <p:sldId id="364" r:id="rId2"/>
@@ -39,6 +39,7 @@
     <p:sldId id="382" r:id="rId30"/>
     <p:sldId id="281" r:id="rId31"/>
     <p:sldId id="399" r:id="rId32"/>
+    <p:sldId id="2147469511" r:id="rId33"/>
   </p:sldIdLst>
   <p:sldSz cx="12192000" cy="6858000"/>
   <p:notesSz cx="6858000" cy="9144000"/>
@@ -2412,7 +2413,7 @@
           <a:p>
             <a:fld id="{E9C8C57A-904A-401B-9BB0-7B4B963B8AAD}" type="datetimeFigureOut">
               <a:rPr lang="en-US" smtClean="0"/>
-              <a:t>03/17/2024</a:t>
+              <a:t>2024-03-19</a:t>
             </a:fld>
             <a:endParaRPr lang="en-US"/>
           </a:p>
@@ -3076,7 +3077,7 @@
           <a:p>
             <a:fld id="{035CF161-778B-4FCF-8A35-83472121A034}" type="datetimeFigureOut">
               <a:rPr lang="en-US" smtClean="0"/>
-              <a:t>03/17/2024</a:t>
+              <a:t>2024-03-19</a:t>
             </a:fld>
             <a:endParaRPr lang="en-US"/>
           </a:p>
@@ -3274,7 +3275,7 @@
           <a:p>
             <a:fld id="{035CF161-778B-4FCF-8A35-83472121A034}" type="datetimeFigureOut">
               <a:rPr lang="en-US" smtClean="0"/>
-              <a:t>03/17/2024</a:t>
+              <a:t>2024-03-19</a:t>
             </a:fld>
             <a:endParaRPr lang="en-US"/>
           </a:p>
@@ -3482,7 +3483,7 @@
           <a:p>
             <a:fld id="{035CF161-778B-4FCF-8A35-83472121A034}" type="datetimeFigureOut">
               <a:rPr lang="en-US" smtClean="0"/>
-              <a:t>03/17/2024</a:t>
+              <a:t>2024-03-19</a:t>
             </a:fld>
             <a:endParaRPr lang="en-US"/>
           </a:p>
@@ -3824,7 +3825,7 @@
           <a:p>
             <a:fld id="{035CF161-778B-4FCF-8A35-83472121A034}" type="datetimeFigureOut">
               <a:rPr lang="en-US" smtClean="0"/>
-              <a:t>03/17/2024</a:t>
+              <a:t>2024-03-19</a:t>
             </a:fld>
             <a:endParaRPr lang="en-US"/>
           </a:p>
@@ -4099,7 +4100,7 @@
           <a:p>
             <a:fld id="{035CF161-778B-4FCF-8A35-83472121A034}" type="datetimeFigureOut">
               <a:rPr lang="en-US" smtClean="0"/>
-              <a:t>03/17/2024</a:t>
+              <a:t>2024-03-19</a:t>
             </a:fld>
             <a:endParaRPr lang="en-US"/>
           </a:p>
@@ -4364,7 +4365,7 @@
           <a:p>
             <a:fld id="{035CF161-778B-4FCF-8A35-83472121A034}" type="datetimeFigureOut">
               <a:rPr lang="en-US" smtClean="0"/>
-              <a:t>03/17/2024</a:t>
+              <a:t>2024-03-19</a:t>
             </a:fld>
             <a:endParaRPr lang="en-US"/>
           </a:p>
@@ -4776,7 +4777,7 @@
           <a:p>
             <a:fld id="{035CF161-778B-4FCF-8A35-83472121A034}" type="datetimeFigureOut">
               <a:rPr lang="en-US" smtClean="0"/>
-              <a:t>03/17/2024</a:t>
+              <a:t>2024-03-19</a:t>
             </a:fld>
             <a:endParaRPr lang="en-US"/>
           </a:p>
@@ -4917,7 +4918,7 @@
           <a:p>
             <a:fld id="{035CF161-778B-4FCF-8A35-83472121A034}" type="datetimeFigureOut">
               <a:rPr lang="en-US" smtClean="0"/>
-              <a:t>03/17/2024</a:t>
+              <a:t>2024-03-19</a:t>
             </a:fld>
             <a:endParaRPr lang="en-US"/>
           </a:p>
@@ -5030,7 +5031,7 @@
           <a:p>
             <a:fld id="{035CF161-778B-4FCF-8A35-83472121A034}" type="datetimeFigureOut">
               <a:rPr lang="en-US" smtClean="0"/>
-              <a:t>03/17/2024</a:t>
+              <a:t>2024-03-19</a:t>
             </a:fld>
             <a:endParaRPr lang="en-US"/>
           </a:p>
@@ -5341,7 +5342,7 @@
           <a:p>
             <a:fld id="{035CF161-778B-4FCF-8A35-83472121A034}" type="datetimeFigureOut">
               <a:rPr lang="en-US" smtClean="0"/>
-              <a:t>03/17/2024</a:t>
+              <a:t>2024-03-19</a:t>
             </a:fld>
             <a:endParaRPr lang="en-US"/>
           </a:p>
@@ -5629,7 +5630,7 @@
           <a:p>
             <a:fld id="{035CF161-778B-4FCF-8A35-83472121A034}" type="datetimeFigureOut">
               <a:rPr lang="en-US" smtClean="0"/>
-              <a:t>03/17/2024</a:t>
+              <a:t>2024-03-19</a:t>
             </a:fld>
             <a:endParaRPr lang="en-US"/>
           </a:p>
@@ -5870,7 +5871,7 @@
           <a:p>
             <a:fld id="{035CF161-778B-4FCF-8A35-83472121A034}" type="datetimeFigureOut">
               <a:rPr lang="en-US" smtClean="0"/>
-              <a:t>03/17/2024</a:t>
+              <a:t>2024-03-19</a:t>
             </a:fld>
             <a:endParaRPr lang="en-US"/>
           </a:p>
@@ -20893,6 +20894,325 @@
 </p:sld>
 </file>
 
+<file path=ppt/slides/slide32.xml><?xml version="1.0" encoding="utf-8"?>
+<p:sld xmlns:a="http://schemas.openxmlformats.org/drawingml/2006/main" xmlns:r="http://schemas.openxmlformats.org/officeDocument/2006/relationships" xmlns:p="http://schemas.openxmlformats.org/presentationml/2006/main">
+  <p:cSld>
+    <p:bg>
+      <p:bgPr>
+        <a:gradFill>
+          <a:gsLst>
+            <a:gs pos="0">
+              <a:srgbClr val="2F2362"/>
+            </a:gs>
+            <a:gs pos="100000">
+              <a:srgbClr val="190E5F"/>
+            </a:gs>
+          </a:gsLst>
+          <a:lin ang="0" scaled="0"/>
+        </a:gradFill>
+        <a:effectLst/>
+      </p:bgPr>
+    </p:bg>
+    <p:spTree>
+      <p:nvGrpSpPr>
+        <p:cNvPr id="1" name=""/>
+        <p:cNvGrpSpPr/>
+        <p:nvPr/>
+      </p:nvGrpSpPr>
+      <p:grpSpPr>
+        <a:xfrm>
+          <a:off x="0" y="0"/>
+          <a:ext cx="0" cy="0"/>
+          <a:chOff x="0" y="0"/>
+          <a:chExt cx="0" cy="0"/>
+        </a:xfrm>
+      </p:grpSpPr>
+      <p:pic>
+        <p:nvPicPr>
+          <p:cNvPr id="7" name="Picture 6" descr="A purple and blue background with a picture of a building&#10;&#10;Description automatically generated">
+            <a:extLst>
+              <a:ext uri="{FF2B5EF4-FFF2-40B4-BE49-F238E27FC236}">
+                <a16:creationId xmlns:a16="http://schemas.microsoft.com/office/drawing/2014/main" id="{FF148CD1-B8D7-FC4D-733B-FBE758E3E97E}"/>
+              </a:ext>
+            </a:extLst>
+          </p:cNvPr>
+          <p:cNvPicPr>
+            <a:picLocks noChangeAspect="1"/>
+          </p:cNvPicPr>
+          <p:nvPr/>
+        </p:nvPicPr>
+        <p:blipFill>
+          <a:blip r:embed="rId2">
+            <a:extLst>
+              <a:ext uri="{28A0092B-C50C-407E-A947-70E740481C1C}">
+                <a14:useLocalDpi xmlns:a14="http://schemas.microsoft.com/office/drawing/2010/main" val="0"/>
+              </a:ext>
+            </a:extLst>
+          </a:blip>
+          <a:stretch>
+            <a:fillRect/>
+          </a:stretch>
+        </p:blipFill>
+        <p:spPr>
+          <a:xfrm>
+            <a:off x="5334000" y="0"/>
+            <a:ext cx="6858000" cy="6858000"/>
+          </a:xfrm>
+          <a:prstGeom prst="rect">
+            <a:avLst/>
+          </a:prstGeom>
+        </p:spPr>
+      </p:pic>
+      <p:sp>
+        <p:nvSpPr>
+          <p:cNvPr id="8" name="Content Placeholder 2">
+            <a:extLst>
+              <a:ext uri="{FF2B5EF4-FFF2-40B4-BE49-F238E27FC236}">
+                <a16:creationId xmlns:a16="http://schemas.microsoft.com/office/drawing/2014/main" id="{479A36F1-AFE9-5E48-2183-86EF8DBA9055}"/>
+              </a:ext>
+            </a:extLst>
+          </p:cNvPr>
+          <p:cNvSpPr>
+            <a:spLocks noGrp="1"/>
+          </p:cNvSpPr>
+          <p:nvPr>
+            <p:ph idx="1"/>
+          </p:nvPr>
+        </p:nvSpPr>
+        <p:spPr>
+          <a:xfrm>
+            <a:off x="838200" y="1825625"/>
+            <a:ext cx="10515600" cy="4351338"/>
+          </a:xfrm>
+        </p:spPr>
+        <p:txBody>
+          <a:bodyPr/>
+          <a:lstStyle/>
+          <a:p>
+            <a:r>
+              <a:rPr lang="en-US" dirty="0">
+                <a:solidFill>
+                  <a:srgbClr val="FFFFFF"/>
+                </a:solidFill>
+              </a:rPr>
+              <a:t>Free for Students</a:t>
+            </a:r>
+          </a:p>
+          <a:p>
+            <a:r>
+              <a:rPr lang="en-US" dirty="0">
+                <a:solidFill>
+                  <a:srgbClr val="FFFFFF"/>
+                </a:solidFill>
+              </a:rPr>
+              <a:t>Code: MEEETUPDATEBRNO</a:t>
+            </a:r>
+          </a:p>
+          <a:p>
+            <a:r>
+              <a:rPr lang="en-US" dirty="0">
+                <a:solidFill>
+                  <a:srgbClr val="FFFFFF"/>
+                </a:solidFill>
+              </a:rPr>
+              <a:t>https://brno.meetupdate.cz</a:t>
+            </a:r>
+          </a:p>
+        </p:txBody>
+      </p:sp>
+    </p:spTree>
+    <p:extLst>
+      <p:ext uri="{BB962C8B-B14F-4D97-AF65-F5344CB8AC3E}">
+        <p14:creationId xmlns:p14="http://schemas.microsoft.com/office/powerpoint/2010/main" val="4080239454"/>
+      </p:ext>
+    </p:extLst>
+  </p:cSld>
+  <p:clrMapOvr>
+    <a:masterClrMapping/>
+  </p:clrMapOvr>
+  <p:timing>
+    <p:tnLst>
+      <p:par>
+        <p:cTn id="1" dur="indefinite" restart="never" nodeType="tmRoot">
+          <p:childTnLst>
+            <p:seq concurrent="1" nextAc="seek">
+              <p:cTn id="2" dur="indefinite" nodeType="mainSeq">
+                <p:childTnLst>
+                  <p:par>
+                    <p:cTn id="3" fill="hold">
+                      <p:stCondLst>
+                        <p:cond delay="indefinite"/>
+                      </p:stCondLst>
+                      <p:childTnLst>
+                        <p:par>
+                          <p:cTn id="4" fill="hold">
+                            <p:stCondLst>
+                              <p:cond delay="0"/>
+                            </p:stCondLst>
+                            <p:childTnLst>
+                              <p:par>
+                                <p:cTn id="5" presetID="1" presetClass="entr" presetSubtype="0" fill="hold" grpId="0" nodeType="clickEffect">
+                                  <p:stCondLst>
+                                    <p:cond delay="0"/>
+                                  </p:stCondLst>
+                                  <p:childTnLst>
+                                    <p:set>
+                                      <p:cBhvr>
+                                        <p:cTn id="6" dur="1" fill="hold">
+                                          <p:stCondLst>
+                                            <p:cond delay="0"/>
+                                          </p:stCondLst>
+                                        </p:cTn>
+                                        <p:tgtEl>
+                                          <p:spTgt spid="8">
+                                            <p:txEl>
+                                              <p:pRg st="0" end="0"/>
+                                            </p:txEl>
+                                          </p:spTgt>
+                                        </p:tgtEl>
+                                        <p:attrNameLst>
+                                          <p:attrName>style.visibility</p:attrName>
+                                        </p:attrNameLst>
+                                      </p:cBhvr>
+                                      <p:to>
+                                        <p:strVal val="visible"/>
+                                      </p:to>
+                                    </p:set>
+                                  </p:childTnLst>
+                                </p:cTn>
+                              </p:par>
+                            </p:childTnLst>
+                          </p:cTn>
+                        </p:par>
+                      </p:childTnLst>
+                    </p:cTn>
+                  </p:par>
+                  <p:par>
+                    <p:cTn id="7" fill="hold">
+                      <p:stCondLst>
+                        <p:cond delay="indefinite"/>
+                      </p:stCondLst>
+                      <p:childTnLst>
+                        <p:par>
+                          <p:cTn id="8" fill="hold">
+                            <p:stCondLst>
+                              <p:cond delay="0"/>
+                            </p:stCondLst>
+                            <p:childTnLst>
+                              <p:par>
+                                <p:cTn id="9" presetID="1" presetClass="entr" presetSubtype="0" fill="hold" grpId="0" nodeType="clickEffect">
+                                  <p:stCondLst>
+                                    <p:cond delay="0"/>
+                                  </p:stCondLst>
+                                  <p:childTnLst>
+                                    <p:set>
+                                      <p:cBhvr>
+                                        <p:cTn id="10" dur="1" fill="hold">
+                                          <p:stCondLst>
+                                            <p:cond delay="0"/>
+                                          </p:stCondLst>
+                                        </p:cTn>
+                                        <p:tgtEl>
+                                          <p:spTgt spid="8">
+                                            <p:txEl>
+                                              <p:pRg st="1" end="1"/>
+                                            </p:txEl>
+                                          </p:spTgt>
+                                        </p:tgtEl>
+                                        <p:attrNameLst>
+                                          <p:attrName>style.visibility</p:attrName>
+                                        </p:attrNameLst>
+                                      </p:cBhvr>
+                                      <p:to>
+                                        <p:strVal val="visible"/>
+                                      </p:to>
+                                    </p:set>
+                                  </p:childTnLst>
+                                </p:cTn>
+                              </p:par>
+                            </p:childTnLst>
+                          </p:cTn>
+                        </p:par>
+                      </p:childTnLst>
+                    </p:cTn>
+                  </p:par>
+                  <p:par>
+                    <p:cTn id="11" fill="hold">
+                      <p:stCondLst>
+                        <p:cond delay="indefinite"/>
+                      </p:stCondLst>
+                      <p:childTnLst>
+                        <p:par>
+                          <p:cTn id="12" fill="hold">
+                            <p:stCondLst>
+                              <p:cond delay="0"/>
+                            </p:stCondLst>
+                            <p:childTnLst>
+                              <p:par>
+                                <p:cTn id="13" presetID="1" presetClass="entr" presetSubtype="0" fill="hold" grpId="0" nodeType="clickEffect">
+                                  <p:stCondLst>
+                                    <p:cond delay="0"/>
+                                  </p:stCondLst>
+                                  <p:childTnLst>
+                                    <p:set>
+                                      <p:cBhvr>
+                                        <p:cTn id="14" dur="1" fill="hold">
+                                          <p:stCondLst>
+                                            <p:cond delay="0"/>
+                                          </p:stCondLst>
+                                        </p:cTn>
+                                        <p:tgtEl>
+                                          <p:spTgt spid="8">
+                                            <p:txEl>
+                                              <p:pRg st="2" end="2"/>
+                                            </p:txEl>
+                                          </p:spTgt>
+                                        </p:tgtEl>
+                                        <p:attrNameLst>
+                                          <p:attrName>style.visibility</p:attrName>
+                                        </p:attrNameLst>
+                                      </p:cBhvr>
+                                      <p:to>
+                                        <p:strVal val="visible"/>
+                                      </p:to>
+                                    </p:set>
+                                  </p:childTnLst>
+                                </p:cTn>
+                              </p:par>
+                            </p:childTnLst>
+                          </p:cTn>
+                        </p:par>
+                      </p:childTnLst>
+                    </p:cTn>
+                  </p:par>
+                </p:childTnLst>
+              </p:cTn>
+              <p:prevCondLst>
+                <p:cond evt="onPrev" delay="0">
+                  <p:tgtEl>
+                    <p:sldTgt/>
+                  </p:tgtEl>
+                </p:cond>
+              </p:prevCondLst>
+              <p:nextCondLst>
+                <p:cond evt="onNext" delay="0">
+                  <p:tgtEl>
+                    <p:sldTgt/>
+                  </p:tgtEl>
+                </p:cond>
+              </p:nextCondLst>
+            </p:seq>
+          </p:childTnLst>
+        </p:cTn>
+      </p:par>
+    </p:tnLst>
+    <p:bldLst>
+      <p:bldP spid="8" grpId="0" build="p"/>
+    </p:bldLst>
+  </p:timing>
+</p:sld>
+</file>
+
 <file path=ppt/slides/slide4.xml><?xml version="1.0" encoding="utf-8"?>
 <p:sld xmlns:a="http://schemas.openxmlformats.org/drawingml/2006/main" xmlns:r="http://schemas.openxmlformats.org/officeDocument/2006/relationships" xmlns:p="http://schemas.openxmlformats.org/presentationml/2006/main">
   <p:cSld>
@@ -21093,7 +21413,7 @@
                 <a:ea typeface="Open Sans" panose="020B0606030504020204" pitchFamily="34" charset="0"/>
                 <a:cs typeface="Open Sans" panose="020B0606030504020204" pitchFamily="34" charset="0"/>
               </a:rPr>
-              <a:t>.NET 7</a:t>
+              <a:t>.NET</a:t>
             </a:r>
           </a:p>
         </p:txBody>

</xml_diff>